<commit_message>
Updated select and where slides and speaker notes
</commit_message>
<xml_diff>
--- a/src/select.pptx
+++ b/src/select.pptx
@@ -11299,6 +11299,22 @@
             <a:br/>
             <a:r>
               <a:rPr/>
+              <a:t>Suman</a:t>
+            </a:r>
+            <a:r>
+              <a:rPr/>
+              <a:t> </a:t>
+            </a:r>
+            <a:r>
+              <a:rPr/>
+              <a:t>Sahil,</a:t>
+            </a:r>
+            <a:r>
+              <a:rPr/>
+              <a:t> </a:t>
+            </a:r>
+            <a:r>
+              <a:rPr/>
               <a:t>Steve</a:t>
             </a:r>
             <a:r>
@@ -11332,23 +11348,23 @@
             </a:pPr>
             <a:r>
               <a:rPr/>
-              <a:t>September</a:t>
-            </a:r>
-            <a:r>
-              <a:rPr/>
-              <a:t> </a:t>
-            </a:r>
-            <a:r>
-              <a:rPr/>
-              <a:t>12,</a:t>
-            </a:r>
-            <a:r>
-              <a:rPr/>
-              <a:t> </a:t>
-            </a:r>
-            <a:r>
-              <a:rPr/>
-              <a:t>2017</a:t>
+              <a:t>Creation</a:t>
+            </a:r>
+            <a:r>
+              <a:rPr/>
+              <a:t> </a:t>
+            </a:r>
+            <a:r>
+              <a:rPr/>
+              <a:t>date:</a:t>
+            </a:r>
+            <a:r>
+              <a:rPr/>
+              <a:t> </a:t>
+            </a:r>
+            <a:r>
+              <a:rPr/>
+              <a:t>2017-09-12</a:t>
             </a:r>
           </a:p>
         </p:txBody>

</xml_diff>